<commit_message>
TASK: Merge full presentation
Document with the full information about vehicle-trailer dynamic

Resolves: Vehicle-Trailer Dynamics #20 and #27

Signed-off-by: Sara Ofelia Moreno Lopez <morenolopezsaraofelia@gmail.com>
</commit_message>
<xml_diff>
--- a/External/Knowledg_sharing/Lateral Control Passenger Cars with Trailer.pptx
+++ b/External/Knowledg_sharing/Lateral Control Passenger Cars with Trailer.pptx
@@ -305,7 +305,7 @@
             <a:fld id="{F8C568D1-65C2-4CDE-9B8E-4F04E333B056}" type="datetimeFigureOut">
               <a:rPr lang="en-US" smtClean="0"/>
               <a:pPr/>
-              <a:t>6/17/2020</a:t>
+              <a:t>6/22/2020</a:t>
             </a:fld>
             <a:endParaRPr lang="en-US"/>
           </a:p>
@@ -3453,7 +3453,7 @@
             <a:fld id="{B95F1328-8865-4437-B9B5-1B98AE42546C}" type="datetime3">
               <a:rPr lang="en-US" noProof="0" smtClean="0"/>
               <a:pPr/>
-              <a:t>17 June 2020</a:t>
+              <a:t>22 June 2020</a:t>
             </a:fld>
             <a:endParaRPr lang="en-US" noProof="0"/>
           </a:p>
@@ -3857,7 +3857,7 @@
             <a:fld id="{B9F64C55-3C07-4FCB-9F06-CA7928BDD2EB}" type="datetime3">
               <a:rPr lang="en-US" noProof="0" smtClean="0"/>
               <a:pPr/>
-              <a:t>17 June 2020</a:t>
+              <a:t>22 June 2020</a:t>
             </a:fld>
             <a:endParaRPr lang="en-US" noProof="0"/>
           </a:p>
@@ -4643,7 +4643,7 @@
             <a:fld id="{A144BB05-B6BD-4EAF-8D90-F01B136B4D17}" type="datetime3">
               <a:rPr lang="en-US" noProof="0" smtClean="0"/>
               <a:pPr/>
-              <a:t>17 June 2020</a:t>
+              <a:t>22 June 2020</a:t>
             </a:fld>
             <a:endParaRPr lang="en-US" noProof="0"/>
           </a:p>
@@ -5265,7 +5265,7 @@
             <a:fld id="{BDE66952-8BA7-4545-9894-562BD7F5549F}" type="datetime3">
               <a:rPr lang="en-US" noProof="0" smtClean="0"/>
               <a:pPr/>
-              <a:t>17 June 2020</a:t>
+              <a:t>22 June 2020</a:t>
             </a:fld>
             <a:endParaRPr lang="en-US" noProof="0"/>
           </a:p>
@@ -5886,7 +5886,7 @@
             <a:fld id="{827E051F-9C00-4D71-9B67-0FF240BFCC4F}" type="datetime3">
               <a:rPr lang="en-US" noProof="0" smtClean="0"/>
               <a:pPr/>
-              <a:t>17 June 2020</a:t>
+              <a:t>22 June 2020</a:t>
             </a:fld>
             <a:endParaRPr lang="en-US" noProof="0"/>
           </a:p>
@@ -6008,7 +6008,7 @@
             <a:fld id="{6B9D1A53-3D50-465D-BEE6-D62CB4527C46}" type="datetime3">
               <a:rPr lang="en-US" noProof="0" smtClean="0"/>
               <a:pPr/>
-              <a:t>17 June 2020</a:t>
+              <a:t>22 June 2020</a:t>
             </a:fld>
             <a:endParaRPr lang="en-US" noProof="0"/>
           </a:p>
@@ -6325,7 +6325,7 @@
             <a:fld id="{44EADE39-D176-4F20-980F-C8D999BF5D0B}" type="datetime3">
               <a:rPr lang="en-US" noProof="0" smtClean="0"/>
               <a:pPr/>
-              <a:t>17 June 2020</a:t>
+              <a:t>22 June 2020</a:t>
             </a:fld>
             <a:endParaRPr lang="en-US" noProof="0"/>
           </a:p>
@@ -6868,7 +6868,7 @@
             <a:fld id="{20CAE601-AA0A-4E2D-A23A-B8A0B5331932}" type="datetime3">
               <a:rPr lang="en-US" noProof="0" smtClean="0"/>
               <a:pPr/>
-              <a:t>17 June 2020</a:t>
+              <a:t>22 June 2020</a:t>
             </a:fld>
             <a:endParaRPr lang="en-US" noProof="0"/>
           </a:p>
@@ -7400,7 +7400,7 @@
             <a:fld id="{5A8F701C-372F-4C4A-8037-9EE90099ED8D}" type="datetime3">
               <a:rPr lang="en-US" noProof="0" smtClean="0"/>
               <a:pPr/>
-              <a:t>17 June 2020</a:t>
+              <a:t>22 June 2020</a:t>
             </a:fld>
             <a:endParaRPr lang="en-US" noProof="0"/>
           </a:p>
@@ -8000,7 +8000,7 @@
             <a:fld id="{AA1A14F1-A98B-4B01-AB5C-4EDA8538C6C0}" type="datetime3">
               <a:rPr lang="en-US" noProof="0" smtClean="0"/>
               <a:pPr/>
-              <a:t>17 June 2020</a:t>
+              <a:t>22 June 2020</a:t>
             </a:fld>
             <a:endParaRPr lang="en-US" noProof="0"/>
           </a:p>
@@ -10083,7 +10083,7 @@
             <a:fld id="{2A0CE834-690D-4F26-8C93-130BA36FD7C0}" type="datetime3">
               <a:rPr lang="en-US" noProof="0" smtClean="0"/>
               <a:pPr/>
-              <a:t>17 June 2020</a:t>
+              <a:t>22 June 2020</a:t>
             </a:fld>
             <a:endParaRPr lang="en-US" noProof="0"/>
           </a:p>
@@ -10732,7 +10732,7 @@
             <a:fld id="{B7223074-4D72-465E-909D-7D1DBB514C91}" type="datetime3">
               <a:rPr lang="en-US" noProof="0" smtClean="0"/>
               <a:pPr/>
-              <a:t>17 June 2020</a:t>
+              <a:t>22 June 2020</a:t>
             </a:fld>
             <a:endParaRPr lang="en-US" noProof="0"/>
           </a:p>
@@ -11155,7 +11155,7 @@
             <a:fld id="{BF0A75B6-8E1B-4380-84B9-49631E7ED158}" type="datetime3">
               <a:rPr lang="en-US" noProof="0" smtClean="0"/>
               <a:pPr/>
-              <a:t>17 June 2020</a:t>
+              <a:t>22 June 2020</a:t>
             </a:fld>
             <a:endParaRPr lang="en-US" noProof="0"/>
           </a:p>
@@ -11770,7 +11770,7 @@
             <a:fld id="{445A1C77-F3AB-418B-BB96-BF86CA98ED28}" type="datetime3">
               <a:rPr lang="en-US" noProof="0" smtClean="0"/>
               <a:pPr/>
-              <a:t>17 June 2020</a:t>
+              <a:t>22 June 2020</a:t>
             </a:fld>
             <a:endParaRPr lang="en-US" noProof="0"/>
           </a:p>
@@ -12135,7 +12135,7 @@
             <a:fld id="{4D1B2569-E16F-4FFF-9EC5-29BC0236DFAB}" type="datetime3">
               <a:rPr lang="en-US" noProof="0" smtClean="0"/>
               <a:pPr/>
-              <a:t>17 June 2020</a:t>
+              <a:t>22 June 2020</a:t>
             </a:fld>
             <a:endParaRPr lang="en-US" noProof="0"/>
           </a:p>
@@ -12568,7 +12568,7 @@
             <a:fld id="{446C7CFE-FDAE-4A50-A309-ACAE703BAE6B}" type="datetime3">
               <a:rPr lang="en-US" noProof="0" smtClean="0"/>
               <a:pPr/>
-              <a:t>17 June 2020</a:t>
+              <a:t>22 June 2020</a:t>
             </a:fld>
             <a:endParaRPr lang="en-US" noProof="0"/>
           </a:p>
@@ -13540,7 +13540,7 @@
         </p:nvSpPr>
         <p:spPr>
           <a:xfrm>
-            <a:off x="395289" y="303213"/>
+            <a:off x="395289" y="241425"/>
             <a:ext cx="8353500" cy="720600"/>
           </a:xfrm>
           <a:prstGeom prst="rect">
@@ -13575,10 +13575,10 @@
               <a:buNone/>
             </a:pPr>
             <a:r>
-              <a:rPr lang="en-US"/>
+              <a:rPr lang="en-US" dirty="0"/>
               <a:t>System of linear equations to the vehicle-trailer combination</a:t>
             </a:r>
-            <a:endParaRPr/>
+            <a:endParaRPr dirty="0"/>
           </a:p>
         </p:txBody>
       </p:sp>
@@ -13594,7 +13594,7 @@
         </p:nvSpPr>
         <p:spPr>
           <a:xfrm>
-            <a:off x="395300" y="962025"/>
+            <a:off x="395300" y="1012659"/>
             <a:ext cx="8353500" cy="3194100"/>
           </a:xfrm>
           <a:prstGeom prst="rect">
@@ -13626,10 +13626,10 @@
               <a:buChar char="›"/>
             </a:pPr>
             <a:r>
-              <a:rPr lang="en-US"/>
+              <a:rPr lang="en-US" dirty="0"/>
               <a:t>The system written in a matrix form is:</a:t>
             </a:r>
-            <a:endParaRPr/>
+            <a:endParaRPr dirty="0"/>
           </a:p>
           <a:p>
             <a:pPr marL="177800" lvl="0" indent="-177800" algn="l" rtl="0">
@@ -13646,12 +13646,12 @@
               <a:buChar char="›"/>
             </a:pPr>
             <a:br>
-              <a:rPr lang="en-US"/>
+              <a:rPr lang="en-US" dirty="0"/>
             </a:br>
             <a:br>
-              <a:rPr lang="en-US"/>
+              <a:rPr lang="en-US" dirty="0"/>
             </a:br>
-            <a:endParaRPr/>
+            <a:endParaRPr dirty="0"/>
           </a:p>
           <a:p>
             <a:pPr marL="177800" lvl="0" indent="-177800" algn="l" rtl="0">
@@ -13668,29 +13668,29 @@
               <a:buChar char="›"/>
             </a:pPr>
             <a:r>
-              <a:rPr lang="en-US"/>
+              <a:rPr lang="en-US" dirty="0"/>
               <a:t>Matrices </a:t>
             </a:r>
             <a:r>
-              <a:rPr lang="en-US" b="1"/>
+              <a:rPr lang="en-US" b="1" dirty="0"/>
               <a:t>M, E </a:t>
             </a:r>
             <a:r>
-              <a:rPr lang="en-US"/>
+              <a:rPr lang="en-US" dirty="0"/>
               <a:t>y</a:t>
             </a:r>
             <a:r>
-              <a:rPr lang="en-US" b="1"/>
+              <a:rPr lang="en-US" b="1" dirty="0"/>
               <a:t> F </a:t>
             </a:r>
             <a:r>
-              <a:rPr lang="en-US"/>
+              <a:rPr lang="en-US" dirty="0"/>
               <a:t>are constant  </a:t>
             </a:r>
             <a:br>
-              <a:rPr lang="en-US"/>
+              <a:rPr lang="en-US" dirty="0"/>
             </a:br>
-            <a:endParaRPr/>
+            <a:endParaRPr dirty="0"/>
           </a:p>
           <a:p>
             <a:pPr marL="177800" lvl="0" indent="-177800" algn="l" rtl="0">
@@ -13706,7 +13706,7 @@
               <a:buSzPts val="2000"/>
               <a:buChar char="›"/>
             </a:pPr>
-            <a:endParaRPr/>
+            <a:endParaRPr dirty="0"/>
           </a:p>
         </p:txBody>
       </p:sp>
@@ -15482,7 +15482,7 @@
             <a:fld id="{AA1A14F1-A98B-4B01-AB5C-4EDA8538C6C0}" type="datetime3">
               <a:rPr lang="en-US" noProof="0" smtClean="0"/>
               <a:pPr/>
-              <a:t>17 June 2020</a:t>
+              <a:t>22 June 2020</a:t>
             </a:fld>
             <a:endParaRPr lang="en-US" noProof="0" dirty="0"/>
           </a:p>
@@ -21315,7 +21315,7 @@
             <a:fld id="{AA1A14F1-A98B-4B01-AB5C-4EDA8538C6C0}" type="datetime3">
               <a:rPr lang="en-US" noProof="0" smtClean="0"/>
               <a:pPr/>
-              <a:t>17 June 2020</a:t>
+              <a:t>22 June 2020</a:t>
             </a:fld>
             <a:endParaRPr lang="en-US" noProof="0"/>
           </a:p>
@@ -22088,7 +22088,7 @@
             <a:fld id="{AA1A14F1-A98B-4B01-AB5C-4EDA8538C6C0}" type="datetime3">
               <a:rPr lang="en-US" noProof="0" smtClean="0"/>
               <a:pPr/>
-              <a:t>17 June 2020</a:t>
+              <a:t>22 June 2020</a:t>
             </a:fld>
             <a:endParaRPr lang="en-US" noProof="0"/>
           </a:p>
@@ -22212,12 +22212,8 @@
           <a:lstStyle/>
           <a:p>
             <a:r>
-              <a:rPr lang="es-MX" b="0" dirty="0"/>
-              <a:t>Dynamic </a:t>
-            </a:r>
-            <a:r>
-              <a:rPr lang="es-MX" b="0" dirty="0" err="1"/>
-              <a:t>equations</a:t>
+              <a:rPr lang="en-US" dirty="0"/>
+              <a:t>Dynamic equations</a:t>
             </a:r>
             <a:br>
               <a:rPr lang="es-MX" dirty="0"/>
@@ -22250,7 +22246,7 @@
             <a:fld id="{AA1A14F1-A98B-4B01-AB5C-4EDA8538C6C0}" type="datetime3">
               <a:rPr lang="en-US" noProof="0" smtClean="0"/>
               <a:pPr/>
-              <a:t>17 June 2020</a:t>
+              <a:t>22 June 2020</a:t>
             </a:fld>
             <a:endParaRPr lang="en-US" noProof="0"/>
           </a:p>
@@ -22663,7 +22659,7 @@
             <a:fld id="{AA1A14F1-A98B-4B01-AB5C-4EDA8538C6C0}" type="datetime3">
               <a:rPr lang="en-US" noProof="0" smtClean="0"/>
               <a:pPr/>
-              <a:t>17 June 2020</a:t>
+              <a:t>22 June 2020</a:t>
             </a:fld>
             <a:endParaRPr lang="en-US" noProof="0"/>
           </a:p>
@@ -23624,12 +23620,8 @@
           <a:lstStyle/>
           <a:p>
             <a:r>
-              <a:rPr lang="es-MX" b="0" dirty="0"/>
-              <a:t>Dynamic </a:t>
-            </a:r>
-            <a:r>
-              <a:rPr lang="es-MX" b="0" dirty="0" err="1"/>
-              <a:t>equations</a:t>
+              <a:rPr lang="en-US" dirty="0"/>
+              <a:t>Dynamic equations</a:t>
             </a:r>
             <a:br>
               <a:rPr lang="es-MX" dirty="0"/>
@@ -30269,7 +30261,7 @@
             <a:fld id="{AA1A14F1-A98B-4B01-AB5C-4EDA8538C6C0}" type="datetime3">
               <a:rPr lang="en-US" noProof="0" smtClean="0"/>
               <a:pPr/>
-              <a:t>17 June 2020</a:t>
+              <a:t>22 June 2020</a:t>
             </a:fld>
             <a:endParaRPr lang="en-US" noProof="0"/>
           </a:p>
@@ -30360,12 +30352,8 @@
           <a:lstStyle/>
           <a:p>
             <a:r>
-              <a:rPr lang="es-MX" b="0" dirty="0"/>
-              <a:t>Dynamic </a:t>
-            </a:r>
-            <a:r>
-              <a:rPr lang="es-MX" b="0" dirty="0" err="1"/>
-              <a:t>equations</a:t>
+              <a:rPr lang="en-US" dirty="0"/>
+              <a:t>Dynamic equations</a:t>
             </a:r>
             <a:br>
               <a:rPr lang="es-MX" dirty="0"/>
@@ -31136,7 +31124,7 @@
             <a:fld id="{AA1A14F1-A98B-4B01-AB5C-4EDA8538C6C0}" type="datetime3">
               <a:rPr lang="en-US" noProof="0" smtClean="0"/>
               <a:pPr/>
-              <a:t>17 June 2020</a:t>
+              <a:t>22 June 2020</a:t>
             </a:fld>
             <a:endParaRPr lang="en-US" noProof="0"/>
           </a:p>
@@ -32288,11 +32276,11 @@
           <a:lstStyle/>
           <a:p>
             <a:r>
-              <a:rPr lang="es-MX" b="0" dirty="0"/>
+              <a:rPr lang="es-MX" dirty="0"/>
               <a:t>Dynamic </a:t>
             </a:r>
             <a:r>
-              <a:rPr lang="es-MX" b="0" dirty="0" err="1"/>
+              <a:rPr lang="es-MX" dirty="0" err="1"/>
               <a:t>equations</a:t>
             </a:r>
             <a:br>
@@ -32689,7 +32677,7 @@
             <a:fld id="{AA1A14F1-A98B-4B01-AB5C-4EDA8538C6C0}" type="datetime3">
               <a:rPr lang="en-US" noProof="0" smtClean="0"/>
               <a:pPr/>
-              <a:t>17 June 2020</a:t>
+              <a:t>22 June 2020</a:t>
             </a:fld>
             <a:endParaRPr lang="en-US" noProof="0"/>
           </a:p>
@@ -32780,11 +32768,11 @@
           <a:lstStyle/>
           <a:p>
             <a:r>
-              <a:rPr lang="es-MX" b="0" dirty="0"/>
+              <a:rPr lang="es-MX" dirty="0"/>
               <a:t>Dynamic </a:t>
             </a:r>
             <a:r>
-              <a:rPr lang="es-MX" b="0" dirty="0" err="1"/>
+              <a:rPr lang="es-MX" dirty="0" err="1"/>
               <a:t>equations</a:t>
             </a:r>
             <a:br>

</xml_diff>